<commit_message>
Finish version 1 of LoRA presentation
</commit_message>
<xml_diff>
--- a/seminarios/ciclo 2/TP558_LoRA.pptx
+++ b/seminarios/ciclo 2/TP558_LoRA.pptx
@@ -5,10 +5,10 @@
     <p:sldMasterId id="2147483648" r:id="rId1"/>
   </p:sldMasterIdLst>
   <p:notesMasterIdLst>
-    <p:notesMasterId r:id="rId51"/>
+    <p:notesMasterId r:id="rId52"/>
   </p:notesMasterIdLst>
   <p:handoutMasterIdLst>
-    <p:handoutMasterId r:id="rId52"/>
+    <p:handoutMasterId r:id="rId53"/>
   </p:handoutMasterIdLst>
   <p:sldIdLst>
     <p:sldId id="256" r:id="rId2"/>
@@ -57,9 +57,10 @@
     <p:sldId id="311" r:id="rId45"/>
     <p:sldId id="312" r:id="rId46"/>
     <p:sldId id="313" r:id="rId47"/>
-    <p:sldId id="293" r:id="rId48"/>
+    <p:sldId id="356" r:id="rId48"/>
     <p:sldId id="314" r:id="rId49"/>
     <p:sldId id="306" r:id="rId50"/>
+    <p:sldId id="293" r:id="rId51"/>
   </p:sldIdLst>
   <p:sldSz cx="12192000" cy="6858000"/>
   <p:notesSz cx="7315200" cy="9601200"/>
@@ -5250,8 +5251,8 @@
         </p:nvSpPr>
         <p:spPr>
           <a:xfrm>
-            <a:off x="7915801" y="5780602"/>
-            <a:ext cx="4004345" cy="677108"/>
+            <a:off x="7754113" y="5780602"/>
+            <a:ext cx="4166034" cy="954107"/>
           </a:xfrm>
           <a:prstGeom prst="rect">
             <a:avLst/>
@@ -5266,17 +5267,25 @@
           <a:p>
             <a:r>
               <a:rPr lang="pt-BR" sz="2000" noProof="0" dirty="0"/>
-              <a:t>Adicione aqui seu nome</a:t>
-            </a:r>
-          </a:p>
-          <a:p>
+              <a:t>Pedro Guerrato - 967</a:t>
+            </a:r>
+          </a:p>
+          <a:p>
+            <a:r>
+              <a:rPr lang="pt-BR" noProof="0" dirty="0">
+                <a:hlinkClick r:id="rId3"/>
+              </a:rPr>
+              <a:t>pedro.guerrato@Inatel.br</a:t>
+            </a:r>
             <a:r>
               <a:rPr lang="pt-BR" noProof="0" dirty="0"/>
-              <a:t>Adicione aqui seu </a:t>
-            </a:r>
-            <a:r>
-              <a:rPr lang="pt-BR" noProof="0" dirty="0" err="1"/>
-              <a:t>email</a:t>
+              <a:t>, </a:t>
+            </a:r>
+            <a:r>
+              <a:rPr lang="pt-BR" noProof="0" dirty="0">
+                <a:hlinkClick r:id="rId4"/>
+              </a:rPr>
+              <a:t>pguerrato@gmail.com</a:t>
             </a:r>
             <a:endParaRPr lang="pt-BR" noProof="0" dirty="0"/>
           </a:p>
@@ -5297,7 +5306,7 @@
           <p:nvPr/>
         </p:nvPicPr>
         <p:blipFill rotWithShape="1">
-          <a:blip r:embed="rId3" cstate="print">
+          <a:blip r:embed="rId5" cstate="print">
             <a:extLst>
               <a:ext uri="{28A0092B-C50C-407E-A947-70E740481C1C}">
                 <a14:useLocalDpi xmlns:a14="http://schemas.microsoft.com/office/drawing/2010/main" val="0"/>
@@ -5342,7 +5351,7 @@
           <p:nvPr/>
         </p:nvPicPr>
         <p:blipFill rotWithShape="1">
-          <a:blip r:embed="rId4" cstate="print">
+          <a:blip r:embed="rId6" cstate="print">
             <a:extLst>
               <a:ext uri="{28A0092B-C50C-407E-A947-70E740481C1C}">
                 <a14:useLocalDpi xmlns:a14="http://schemas.microsoft.com/office/drawing/2010/main" val="0"/>
@@ -21763,13 +21772,271 @@
             <p:ph idx="1"/>
           </p:nvPr>
         </p:nvSpPr>
-        <p:spPr/>
+        <p:spPr>
+          <a:xfrm>
+            <a:off x="838200" y="1825625"/>
+            <a:ext cx="4989576" cy="4351338"/>
+          </a:xfrm>
+        </p:spPr>
         <p:txBody>
           <a:bodyPr anchor="t"/>
           <a:lstStyle/>
           <a:p>
+            <a:pPr marL="0" indent="0">
+              <a:buNone/>
+            </a:pPr>
+            <a:r>
+              <a:rPr lang="pt-BR" b="1" noProof="0" dirty="0"/>
+              <a:t>Vantagens</a:t>
+            </a:r>
+          </a:p>
+          <a:p>
+            <a:r>
+              <a:rPr lang="pt-BR" noProof="0" dirty="0"/>
+              <a:t>Eficiência de Treinamento</a:t>
+            </a:r>
+          </a:p>
+          <a:p>
+            <a:r>
+              <a:rPr lang="pt-BR" noProof="0" dirty="0"/>
+              <a:t>Economia de Armazenamento</a:t>
+            </a:r>
+          </a:p>
+          <a:p>
+            <a:r>
+              <a:rPr lang="pt-BR" noProof="0" dirty="0"/>
+              <a:t>Melhor Generalização</a:t>
+            </a:r>
+          </a:p>
+          <a:p>
+            <a:r>
+              <a:rPr lang="pt-BR" noProof="0" dirty="0"/>
+              <a:t>Reutilização do Modelo Base</a:t>
+            </a:r>
+            <a:endParaRPr lang="pt-BR" b="1" noProof="0" dirty="0"/>
+          </a:p>
+        </p:txBody>
+      </p:sp>
+      <p:sp>
+        <p:nvSpPr>
+          <p:cNvPr id="6" name="Espaço Reservado para Conteúdo 2">
+            <a:extLst>
+              <a:ext uri="{FF2B5EF4-FFF2-40B4-BE49-F238E27FC236}">
+                <a16:creationId xmlns:a16="http://schemas.microsoft.com/office/drawing/2014/main" id="{3AE75B90-BC63-C0D9-6E39-94E49D41C5ED}"/>
+              </a:ext>
+            </a:extLst>
+          </p:cNvPr>
+          <p:cNvSpPr txBox="1">
+            <a:spLocks/>
+          </p:cNvSpPr>
+          <p:nvPr/>
+        </p:nvSpPr>
+        <p:spPr>
+          <a:xfrm>
+            <a:off x="6096000" y="1825625"/>
+            <a:ext cx="5257802" cy="4351338"/>
+          </a:xfrm>
+          <a:prstGeom prst="rect">
+            <a:avLst/>
+          </a:prstGeom>
+        </p:spPr>
+        <p:txBody>
+          <a:bodyPr vert="horz" lIns="91440" tIns="45720" rIns="91440" bIns="45720" rtlCol="0" anchor="t">
+            <a:normAutofit/>
+          </a:bodyPr>
+          <a:lstStyle>
+            <a:lvl1pPr marL="228600" indent="-228600" algn="l" defTabSz="914400" rtl="0" eaLnBrk="1" latinLnBrk="0" hangingPunct="1">
+              <a:lnSpc>
+                <a:spcPct val="90000"/>
+              </a:lnSpc>
+              <a:spcBef>
+                <a:spcPts val="1000"/>
+              </a:spcBef>
+              <a:buFont typeface="Arial" panose="020B0604020202020204" pitchFamily="34" charset="0"/>
+              <a:buChar char="•"/>
+              <a:defRPr sz="2800" kern="1200">
+                <a:solidFill>
+                  <a:schemeClr val="tx1"/>
+                </a:solidFill>
+                <a:latin typeface="+mn-lt"/>
+                <a:ea typeface="+mn-ea"/>
+                <a:cs typeface="+mn-cs"/>
+              </a:defRPr>
+            </a:lvl1pPr>
+            <a:lvl2pPr marL="685800" indent="-228600" algn="l" defTabSz="914400" rtl="0" eaLnBrk="1" latinLnBrk="0" hangingPunct="1">
+              <a:lnSpc>
+                <a:spcPct val="90000"/>
+              </a:lnSpc>
+              <a:spcBef>
+                <a:spcPts val="500"/>
+              </a:spcBef>
+              <a:buFont typeface="Arial" panose="020B0604020202020204" pitchFamily="34" charset="0"/>
+              <a:buChar char="•"/>
+              <a:defRPr sz="2400" kern="1200">
+                <a:solidFill>
+                  <a:schemeClr val="tx1"/>
+                </a:solidFill>
+                <a:latin typeface="+mn-lt"/>
+                <a:ea typeface="+mn-ea"/>
+                <a:cs typeface="+mn-cs"/>
+              </a:defRPr>
+            </a:lvl2pPr>
+            <a:lvl3pPr marL="1143000" indent="-228600" algn="l" defTabSz="914400" rtl="0" eaLnBrk="1" latinLnBrk="0" hangingPunct="1">
+              <a:lnSpc>
+                <a:spcPct val="90000"/>
+              </a:lnSpc>
+              <a:spcBef>
+                <a:spcPts val="500"/>
+              </a:spcBef>
+              <a:buFont typeface="Arial" panose="020B0604020202020204" pitchFamily="34" charset="0"/>
+              <a:buChar char="•"/>
+              <a:defRPr sz="2000" kern="1200">
+                <a:solidFill>
+                  <a:schemeClr val="tx1"/>
+                </a:solidFill>
+                <a:latin typeface="+mn-lt"/>
+                <a:ea typeface="+mn-ea"/>
+                <a:cs typeface="+mn-cs"/>
+              </a:defRPr>
+            </a:lvl3pPr>
+            <a:lvl4pPr marL="1600200" indent="-228600" algn="l" defTabSz="914400" rtl="0" eaLnBrk="1" latinLnBrk="0" hangingPunct="1">
+              <a:lnSpc>
+                <a:spcPct val="90000"/>
+              </a:lnSpc>
+              <a:spcBef>
+                <a:spcPts val="500"/>
+              </a:spcBef>
+              <a:buFont typeface="Arial" panose="020B0604020202020204" pitchFamily="34" charset="0"/>
+              <a:buChar char="•"/>
+              <a:defRPr sz="1800" kern="1200">
+                <a:solidFill>
+                  <a:schemeClr val="tx1"/>
+                </a:solidFill>
+                <a:latin typeface="+mn-lt"/>
+                <a:ea typeface="+mn-ea"/>
+                <a:cs typeface="+mn-cs"/>
+              </a:defRPr>
+            </a:lvl4pPr>
+            <a:lvl5pPr marL="2057400" indent="-228600" algn="l" defTabSz="914400" rtl="0" eaLnBrk="1" latinLnBrk="0" hangingPunct="1">
+              <a:lnSpc>
+                <a:spcPct val="90000"/>
+              </a:lnSpc>
+              <a:spcBef>
+                <a:spcPts val="500"/>
+              </a:spcBef>
+              <a:buFont typeface="Arial" panose="020B0604020202020204" pitchFamily="34" charset="0"/>
+              <a:buChar char="•"/>
+              <a:defRPr sz="1800" kern="1200">
+                <a:solidFill>
+                  <a:schemeClr val="tx1"/>
+                </a:solidFill>
+                <a:latin typeface="+mn-lt"/>
+                <a:ea typeface="+mn-ea"/>
+                <a:cs typeface="+mn-cs"/>
+              </a:defRPr>
+            </a:lvl5pPr>
+            <a:lvl6pPr marL="2514600" indent="-228600" algn="l" defTabSz="914400" rtl="0" eaLnBrk="1" latinLnBrk="0" hangingPunct="1">
+              <a:lnSpc>
+                <a:spcPct val="90000"/>
+              </a:lnSpc>
+              <a:spcBef>
+                <a:spcPts val="500"/>
+              </a:spcBef>
+              <a:buFont typeface="Arial" panose="020B0604020202020204" pitchFamily="34" charset="0"/>
+              <a:buChar char="•"/>
+              <a:defRPr sz="1800" kern="1200">
+                <a:solidFill>
+                  <a:schemeClr val="tx1"/>
+                </a:solidFill>
+                <a:latin typeface="+mn-lt"/>
+                <a:ea typeface="+mn-ea"/>
+                <a:cs typeface="+mn-cs"/>
+              </a:defRPr>
+            </a:lvl6pPr>
+            <a:lvl7pPr marL="2971800" indent="-228600" algn="l" defTabSz="914400" rtl="0" eaLnBrk="1" latinLnBrk="0" hangingPunct="1">
+              <a:lnSpc>
+                <a:spcPct val="90000"/>
+              </a:lnSpc>
+              <a:spcBef>
+                <a:spcPts val="500"/>
+              </a:spcBef>
+              <a:buFont typeface="Arial" panose="020B0604020202020204" pitchFamily="34" charset="0"/>
+              <a:buChar char="•"/>
+              <a:defRPr sz="1800" kern="1200">
+                <a:solidFill>
+                  <a:schemeClr val="tx1"/>
+                </a:solidFill>
+                <a:latin typeface="+mn-lt"/>
+                <a:ea typeface="+mn-ea"/>
+                <a:cs typeface="+mn-cs"/>
+              </a:defRPr>
+            </a:lvl7pPr>
+            <a:lvl8pPr marL="3429000" indent="-228600" algn="l" defTabSz="914400" rtl="0" eaLnBrk="1" latinLnBrk="0" hangingPunct="1">
+              <a:lnSpc>
+                <a:spcPct val="90000"/>
+              </a:lnSpc>
+              <a:spcBef>
+                <a:spcPts val="500"/>
+              </a:spcBef>
+              <a:buFont typeface="Arial" panose="020B0604020202020204" pitchFamily="34" charset="0"/>
+              <a:buChar char="•"/>
+              <a:defRPr sz="1800" kern="1200">
+                <a:solidFill>
+                  <a:schemeClr val="tx1"/>
+                </a:solidFill>
+                <a:latin typeface="+mn-lt"/>
+                <a:ea typeface="+mn-ea"/>
+                <a:cs typeface="+mn-cs"/>
+              </a:defRPr>
+            </a:lvl8pPr>
+            <a:lvl9pPr marL="3886200" indent="-228600" algn="l" defTabSz="914400" rtl="0" eaLnBrk="1" latinLnBrk="0" hangingPunct="1">
+              <a:lnSpc>
+                <a:spcPct val="90000"/>
+              </a:lnSpc>
+              <a:spcBef>
+                <a:spcPts val="500"/>
+              </a:spcBef>
+              <a:buFont typeface="Arial" panose="020B0604020202020204" pitchFamily="34" charset="0"/>
+              <a:buChar char="•"/>
+              <a:defRPr sz="1800" kern="1200">
+                <a:solidFill>
+                  <a:schemeClr val="tx1"/>
+                </a:solidFill>
+                <a:latin typeface="+mn-lt"/>
+                <a:ea typeface="+mn-ea"/>
+                <a:cs typeface="+mn-cs"/>
+              </a:defRPr>
+            </a:lvl9pPr>
+          </a:lstStyle>
+          <a:p>
+            <a:pPr marL="0" indent="0">
+              <a:buNone/>
+            </a:pPr>
+            <a:r>
+              <a:rPr lang="pt-BR" b="1" noProof="0" dirty="0"/>
+              <a:t>Desvantagens</a:t>
+            </a:r>
+          </a:p>
+          <a:p>
             <a:pPr/>
-            <a:endParaRPr lang="pt-BR" dirty="0"/>
+            <a:r>
+              <a:rPr lang="pt-BR" noProof="0" dirty="0"/>
+              <a:t>Limitação de Ajuste Completo</a:t>
+            </a:r>
+          </a:p>
+          <a:p>
+            <a:pPr/>
+            <a:r>
+              <a:rPr lang="pt-BR" noProof="0" dirty="0"/>
+              <a:t>Em alguns casos pode ser mais complexo na integração;</a:t>
+            </a:r>
+          </a:p>
+          <a:p>
+            <a:pPr/>
+            <a:r>
+              <a:rPr lang="pt-BR" noProof="0" dirty="0"/>
+              <a:t>Se treinado em uma língua, pode não performer tão bem se usado em outra</a:t>
+            </a:r>
           </a:p>
         </p:txBody>
       </p:sp>
@@ -21860,24 +22127,58 @@
           <a:bodyPr/>
           <a:lstStyle/>
           <a:p>
-            <a:endParaRPr lang="pt-BR" dirty="0">
-              <a:hlinkClick r:id="rId2"/>
-            </a:endParaRPr>
-          </a:p>
-          <a:p>
             <a:r>
               <a:rPr lang="pt-BR" dirty="0">
                 <a:hlinkClick r:id="rId2"/>
               </a:rPr>
-              <a:t>https://colab.research.google.com/github/peremartra/Large-Language-Model-Notebooks-Course/blob/main/5-Fine%20Tuning/LoRA_Tuning_PEFT.ipynb</a:t>
+              <a:t>LoRA tuning – PEFT</a:t>
             </a:r>
             <a:endParaRPr lang="pt-BR" dirty="0"/>
           </a:p>
           <a:p>
+            <a:r>
+              <a:rPr lang="pt-BR" dirty="0">
+                <a:hlinkClick r:id="rId3"/>
+              </a:rPr>
+              <a:t>SDD-LawLLM</a:t>
+            </a:r>
             <a:endParaRPr lang="pt-BR" dirty="0"/>
           </a:p>
           <a:p>
+            <a:r>
+              <a:rPr lang="pt-BR" dirty="0">
+                <a:hlinkClick r:id="rId4"/>
+              </a:rPr>
+              <a:t>Medical QA T5 LoRA Model</a:t>
+            </a:r>
+            <a:endParaRPr lang="pt-BR" dirty="0"/>
+          </a:p>
+          <a:p>
+            <a:r>
+              <a:rPr lang="pt-BR" dirty="0">
+                <a:hlinkClick r:id="rId5"/>
+              </a:rPr>
+              <a:t>MedAlpaca</a:t>
+            </a:r>
+            <a:endParaRPr lang="pt-BR" dirty="0"/>
+          </a:p>
+          <a:p>
+            <a:r>
+              <a:rPr lang="pt-BR" noProof="0" dirty="0">
+                <a:hlinkClick r:id="rId6"/>
+              </a:rPr>
+              <a:t>Image classification using LoRA</a:t>
+            </a:r>
             <a:endParaRPr lang="pt-BR" noProof="0" dirty="0"/>
+          </a:p>
+          <a:p>
+            <a:r>
+              <a:rPr lang="pt-BR" dirty="0">
+                <a:hlinkClick r:id="rId7"/>
+              </a:rPr>
+              <a:t>https://flux-ai.io/flux-dev-lora/</a:t>
+            </a:r>
+            <a:endParaRPr lang="pt-BR" dirty="0"/>
           </a:p>
         </p:txBody>
       </p:sp>
@@ -21939,31 +22240,38 @@
           </a:p>
         </p:txBody>
       </p:sp>
-      <p:sp>
-        <p:nvSpPr>
-          <p:cNvPr id="3" name="Espaço Reservado para Conteúdo 2">
-            <a:extLst>
-              <a:ext uri="{FF2B5EF4-FFF2-40B4-BE49-F238E27FC236}">
-                <a16:creationId xmlns:a16="http://schemas.microsoft.com/office/drawing/2014/main" id="{C525BCE7-C19D-7DDA-016A-E3016C398CBA}"/>
-              </a:ext>
-            </a:extLst>
-          </p:cNvPr>
-          <p:cNvSpPr>
-            <a:spLocks noGrp="1"/>
-          </p:cNvSpPr>
+      <p:pic>
+        <p:nvPicPr>
+          <p:cNvPr id="5" name="Content Placeholder 4">
+            <a:extLst>
+              <a:ext uri="{FF2B5EF4-FFF2-40B4-BE49-F238E27FC236}">
+                <a16:creationId xmlns:a16="http://schemas.microsoft.com/office/drawing/2014/main" id="{B545E595-48F5-2999-EE70-F200F63E7200}"/>
+              </a:ext>
+            </a:extLst>
+          </p:cNvPr>
+          <p:cNvPicPr>
+            <a:picLocks noGrp="1" noChangeAspect="1"/>
+          </p:cNvPicPr>
           <p:nvPr>
             <p:ph idx="1"/>
           </p:nvPr>
-        </p:nvSpPr>
-        <p:spPr/>
-        <p:txBody>
-          <a:bodyPr/>
-          <a:lstStyle/>
-          <a:p>
-            <a:endParaRPr lang="pt-BR" noProof="0" dirty="0"/>
-          </a:p>
-        </p:txBody>
-      </p:sp>
+        </p:nvPicPr>
+        <p:blipFill>
+          <a:blip r:embed="rId2"/>
+          <a:stretch>
+            <a:fillRect/>
+          </a:stretch>
+        </p:blipFill>
+        <p:spPr>
+          <a:xfrm>
+            <a:off x="838200" y="1353312"/>
+            <a:ext cx="10203986" cy="5139563"/>
+          </a:xfrm>
+          <a:prstGeom prst="rect">
+            <a:avLst/>
+          </a:prstGeom>
+        </p:spPr>
+      </p:pic>
     </p:spTree>
     <p:extLst>
       <p:ext uri="{BB962C8B-B14F-4D97-AF65-F5344CB8AC3E}">
@@ -21982,7 +22290,13 @@
   <p:cSld>
     <p:spTree>
       <p:nvGrpSpPr>
-        <p:cNvPr id="1" name=""/>
+        <p:cNvPr id="1" name="">
+          <a:extLst>
+            <a:ext uri="{FF2B5EF4-FFF2-40B4-BE49-F238E27FC236}">
+              <a16:creationId xmlns:a16="http://schemas.microsoft.com/office/drawing/2014/main" id="{8EB39D61-9313-61DB-F70D-F270718A80D2}"/>
+            </a:ext>
+          </a:extLst>
+        </p:cNvPr>
         <p:cNvGrpSpPr/>
         <p:nvPr/>
       </p:nvGrpSpPr>
@@ -21996,64 +22310,68 @@
       </p:grpSpPr>
       <p:sp>
         <p:nvSpPr>
-          <p:cNvPr id="4" name="Título 1">
-            <a:extLst>
-              <a:ext uri="{FF2B5EF4-FFF2-40B4-BE49-F238E27FC236}">
-                <a16:creationId xmlns:a16="http://schemas.microsoft.com/office/drawing/2014/main" id="{32666AC8-2E17-4DB4-B0F5-60C640CCFD2E}"/>
-              </a:ext>
-            </a:extLst>
-          </p:cNvPr>
-          <p:cNvSpPr txBox="1">
-            <a:spLocks/>
+          <p:cNvPr id="2" name="Título 1">
+            <a:extLst>
+              <a:ext uri="{FF2B5EF4-FFF2-40B4-BE49-F238E27FC236}">
+                <a16:creationId xmlns:a16="http://schemas.microsoft.com/office/drawing/2014/main" id="{91A9115B-5701-1F81-8D4B-A6AF63E273A4}"/>
+              </a:ext>
+            </a:extLst>
+          </p:cNvPr>
+          <p:cNvSpPr>
+            <a:spLocks noGrp="1"/>
           </p:cNvSpPr>
-          <p:nvPr/>
+          <p:nvPr>
+            <p:ph type="title"/>
+          </p:nvPr>
         </p:nvSpPr>
+        <p:spPr/>
+        <p:txBody>
+          <a:bodyPr/>
+          <a:lstStyle/>
+          <a:p>
+            <a:r>
+              <a:rPr lang="pt-BR" noProof="0" dirty="0"/>
+              <a:t>Comparação com outros algoritmos</a:t>
+            </a:r>
+          </a:p>
+        </p:txBody>
+      </p:sp>
+      <p:pic>
+        <p:nvPicPr>
+          <p:cNvPr id="7" name="Content Placeholder 6">
+            <a:extLst>
+              <a:ext uri="{FF2B5EF4-FFF2-40B4-BE49-F238E27FC236}">
+                <a16:creationId xmlns:a16="http://schemas.microsoft.com/office/drawing/2014/main" id="{F3A91C01-B840-8255-36AD-61662B89EC28}"/>
+              </a:ext>
+            </a:extLst>
+          </p:cNvPr>
+          <p:cNvPicPr>
+            <a:picLocks noGrp="1" noChangeAspect="1"/>
+          </p:cNvPicPr>
+          <p:nvPr>
+            <p:ph idx="1"/>
+          </p:nvPr>
+        </p:nvPicPr>
+        <p:blipFill>
+          <a:blip r:embed="rId2"/>
+          <a:stretch>
+            <a:fillRect/>
+          </a:stretch>
+        </p:blipFill>
         <p:spPr>
           <a:xfrm>
-            <a:off x="1431533" y="2720526"/>
-            <a:ext cx="9144000" cy="1029541"/>
+            <a:off x="838200" y="1690688"/>
+            <a:ext cx="10445161" cy="4802187"/>
           </a:xfrm>
           <a:prstGeom prst="rect">
             <a:avLst/>
           </a:prstGeom>
         </p:spPr>
-        <p:txBody>
-          <a:bodyPr vert="horz" lIns="91440" tIns="45720" rIns="91440" bIns="45720" rtlCol="0" anchor="ctr">
-            <a:normAutofit/>
-          </a:bodyPr>
-          <a:lstStyle>
-            <a:lvl1pPr algn="l" defTabSz="914400" rtl="0" eaLnBrk="1" latinLnBrk="0" hangingPunct="1">
-              <a:lnSpc>
-                <a:spcPct val="90000"/>
-              </a:lnSpc>
-              <a:spcBef>
-                <a:spcPct val="0"/>
-              </a:spcBef>
-              <a:buNone/>
-              <a:defRPr sz="4400" kern="1200">
-                <a:solidFill>
-                  <a:schemeClr val="tx1"/>
-                </a:solidFill>
-                <a:latin typeface="+mj-lt"/>
-                <a:ea typeface="+mj-ea"/>
-                <a:cs typeface="+mj-cs"/>
-              </a:defRPr>
-            </a:lvl1pPr>
-          </a:lstStyle>
-          <a:p>
-            <a:pPr algn="ctr"/>
-            <a:r>
-              <a:rPr lang="pt-BR" sz="6600" noProof="0" dirty="0"/>
-              <a:t>Perguntas?</a:t>
-            </a:r>
-            <a:endParaRPr lang="pt-BR" sz="6600" b="1" i="1" noProof="0" dirty="0"/>
-          </a:p>
-        </p:txBody>
-      </p:sp>
+      </p:pic>
     </p:spTree>
     <p:extLst>
       <p:ext uri="{BB962C8B-B14F-4D97-AF65-F5344CB8AC3E}">
-        <p14:creationId xmlns:p14="http://schemas.microsoft.com/office/powerpoint/2010/main" val="3773005660"/>
+        <p14:creationId xmlns:p14="http://schemas.microsoft.com/office/powerpoint/2010/main" val="3251747287"/>
       </p:ext>
     </p:extLst>
   </p:cSld>
@@ -22170,6 +22488,18 @@
               </a:rPr>
               <a:t>https://www.youtube.com/watch?v=KEv-F5UkhxU</a:t>
             </a:r>
+            <a:endParaRPr lang="pt-BR" dirty="0"/>
+          </a:p>
+          <a:p>
+            <a:r>
+              <a:rPr lang="pt-BR" dirty="0">
+                <a:hlinkClick r:id="rId6"/>
+              </a:rPr>
+              <a:t>https://huggingface.co/docs/peft/en/index</a:t>
+            </a:r>
+            <a:endParaRPr lang="pt-BR" dirty="0"/>
+          </a:p>
+          <a:p>
             <a:endParaRPr lang="pt-BR" dirty="0"/>
           </a:p>
           <a:p>
@@ -22706,6 +23036,139 @@
       <p:bldP spid="20" grpId="0"/>
     </p:bldLst>
   </p:timing>
+</p:sld>
+</file>
+
+<file path=ppt/slides/slide50.xml><?xml version="1.0" encoding="utf-8"?>
+<p:sld xmlns:a="http://schemas.openxmlformats.org/drawingml/2006/main" xmlns:r="http://schemas.openxmlformats.org/officeDocument/2006/relationships" xmlns:p="http://schemas.openxmlformats.org/presentationml/2006/main">
+  <p:cSld>
+    <p:spTree>
+      <p:nvGrpSpPr>
+        <p:cNvPr id="1" name=""/>
+        <p:cNvGrpSpPr/>
+        <p:nvPr/>
+      </p:nvGrpSpPr>
+      <p:grpSpPr>
+        <a:xfrm>
+          <a:off x="0" y="0"/>
+          <a:ext cx="0" cy="0"/>
+          <a:chOff x="0" y="0"/>
+          <a:chExt cx="0" cy="0"/>
+        </a:xfrm>
+      </p:grpSpPr>
+      <p:sp>
+        <p:nvSpPr>
+          <p:cNvPr id="4" name="Título 1">
+            <a:extLst>
+              <a:ext uri="{FF2B5EF4-FFF2-40B4-BE49-F238E27FC236}">
+                <a16:creationId xmlns:a16="http://schemas.microsoft.com/office/drawing/2014/main" id="{32666AC8-2E17-4DB4-B0F5-60C640CCFD2E}"/>
+              </a:ext>
+            </a:extLst>
+          </p:cNvPr>
+          <p:cNvSpPr txBox="1">
+            <a:spLocks/>
+          </p:cNvSpPr>
+          <p:nvPr/>
+        </p:nvSpPr>
+        <p:spPr>
+          <a:xfrm>
+            <a:off x="1431533" y="2720526"/>
+            <a:ext cx="4237747" cy="1029541"/>
+          </a:xfrm>
+          <a:prstGeom prst="rect">
+            <a:avLst/>
+          </a:prstGeom>
+        </p:spPr>
+        <p:txBody>
+          <a:bodyPr vert="horz" lIns="91440" tIns="45720" rIns="91440" bIns="45720" rtlCol="0" anchor="ctr">
+            <a:normAutofit/>
+          </a:bodyPr>
+          <a:lstStyle>
+            <a:lvl1pPr algn="l" defTabSz="914400" rtl="0" eaLnBrk="1" latinLnBrk="0" hangingPunct="1">
+              <a:lnSpc>
+                <a:spcPct val="90000"/>
+              </a:lnSpc>
+              <a:spcBef>
+                <a:spcPct val="0"/>
+              </a:spcBef>
+              <a:buNone/>
+              <a:defRPr sz="4400" kern="1200">
+                <a:solidFill>
+                  <a:schemeClr val="tx1"/>
+                </a:solidFill>
+                <a:latin typeface="+mj-lt"/>
+                <a:ea typeface="+mj-ea"/>
+                <a:cs typeface="+mj-cs"/>
+              </a:defRPr>
+            </a:lvl1pPr>
+          </a:lstStyle>
+          <a:p>
+            <a:pPr algn="ctr"/>
+            <a:r>
+              <a:rPr lang="pt-BR" sz="6600" noProof="0" dirty="0"/>
+              <a:t>Perguntas?</a:t>
+            </a:r>
+            <a:endParaRPr lang="pt-BR" sz="6600" b="1" i="1" noProof="0" dirty="0"/>
+          </a:p>
+        </p:txBody>
+      </p:sp>
+      <p:pic>
+        <p:nvPicPr>
+          <p:cNvPr id="4098" name="Picture 2" descr="That's All Folks! | MultiVersus Wiki | Fandom">
+            <a:extLst>
+              <a:ext uri="{FF2B5EF4-FFF2-40B4-BE49-F238E27FC236}">
+                <a16:creationId xmlns:a16="http://schemas.microsoft.com/office/drawing/2014/main" id="{E8F8268C-1455-E7F3-4FCE-A61500094428}"/>
+              </a:ext>
+            </a:extLst>
+          </p:cNvPr>
+          <p:cNvPicPr>
+            <a:picLocks noChangeAspect="1" noChangeArrowheads="1"/>
+          </p:cNvPicPr>
+          <p:nvPr/>
+        </p:nvPicPr>
+        <p:blipFill>
+          <a:blip r:embed="rId2">
+            <a:extLst>
+              <a:ext uri="{28A0092B-C50C-407E-A947-70E740481C1C}">
+                <a14:useLocalDpi xmlns:a14="http://schemas.microsoft.com/office/drawing/2010/main" val="0"/>
+              </a:ext>
+            </a:extLst>
+          </a:blip>
+          <a:srcRect/>
+          <a:stretch>
+            <a:fillRect/>
+          </a:stretch>
+        </p:blipFill>
+        <p:spPr bwMode="auto">
+          <a:xfrm>
+            <a:off x="6836664" y="1192276"/>
+            <a:ext cx="4473448" cy="4473448"/>
+          </a:xfrm>
+          <a:prstGeom prst="rect">
+            <a:avLst/>
+          </a:prstGeom>
+          <a:noFill/>
+          <a:extLst>
+            <a:ext uri="{909E8E84-426E-40DD-AFC4-6F175D3DCCD1}">
+              <a14:hiddenFill xmlns:a14="http://schemas.microsoft.com/office/drawing/2010/main">
+                <a:solidFill>
+                  <a:srgbClr val="FFFFFF"/>
+                </a:solidFill>
+              </a14:hiddenFill>
+            </a:ext>
+          </a:extLst>
+        </p:spPr>
+      </p:pic>
+    </p:spTree>
+    <p:extLst>
+      <p:ext uri="{BB962C8B-B14F-4D97-AF65-F5344CB8AC3E}">
+        <p14:creationId xmlns:p14="http://schemas.microsoft.com/office/powerpoint/2010/main" val="3773005660"/>
+      </p:ext>
+    </p:extLst>
+  </p:cSld>
+  <p:clrMapOvr>
+    <a:masterClrMapping/>
+  </p:clrMapOvr>
 </p:sld>
 </file>
 

</xml_diff>